<commit_message>
aggiunti ringraziamenti e ultimata presentazione con discorso
</commit_message>
<xml_diff>
--- a/Presentazione/Presentazione Tesi.pptx
+++ b/Presentazione/Presentazione Tesi.pptx
@@ -39207,7 +39207,7 @@
                 <a:ea typeface="Verdana" panose="020B0604030504040204" pitchFamily="34" charset="0"/>
                 <a:cs typeface="Verdana" panose="020B0604030504040204" pitchFamily="34" charset="0"/>
               </a:rPr>
-              <a:t>Le frequenze catturate vanno poi campionate e decodificate.</a:t>
+              <a:t>Le frequenze catturate vanno poi demodulate e decodificate.</a:t>
             </a:r>
           </a:p>
           <a:p>
@@ -39221,7 +39221,7 @@
                 <a:ea typeface="Verdana" panose="020B0604030504040204" pitchFamily="34" charset="0"/>
                 <a:cs typeface="Verdana" panose="020B0604030504040204" pitchFamily="34" charset="0"/>
               </a:rPr>
-              <a:t>Viene generata una gran quantità di dati, gestibili solo con PC con hardware di ultima generazione.</a:t>
+              <a:t>Viene generata una gran quantità di dati, gestibili solo tramite PC con hardware di ultima generazione.</a:t>
             </a:r>
           </a:p>
           <a:p>
@@ -39937,6 +39937,36 @@
           </a:p>
         </p:txBody>
       </p:sp>
+      <p:pic>
+        <p:nvPicPr>
+          <p:cNvPr id="3" name="Immagine 2" descr="Immagine che contiene elettronico, interni, computer, monitor&#10;&#10;Descrizione generata con affidabilità molto elevata">
+            <a:extLst>
+              <a:ext uri="{FF2B5EF4-FFF2-40B4-BE49-F238E27FC236}">
+                <a16:creationId xmlns:a16="http://schemas.microsoft.com/office/drawing/2014/main" id="{23635B2B-8F99-4C38-BB51-44741FBEC9B0}"/>
+              </a:ext>
+            </a:extLst>
+          </p:cNvPr>
+          <p:cNvPicPr>
+            <a:picLocks noChangeAspect="1"/>
+          </p:cNvPicPr>
+          <p:nvPr/>
+        </p:nvPicPr>
+        <p:blipFill>
+          <a:blip r:embed="rId3"/>
+          <a:stretch>
+            <a:fillRect/>
+          </a:stretch>
+        </p:blipFill>
+        <p:spPr>
+          <a:xfrm>
+            <a:off x="1600199" y="3532174"/>
+            <a:ext cx="9069572" cy="2528656"/>
+          </a:xfrm>
+          <a:prstGeom prst="rect">
+            <a:avLst/>
+          </a:prstGeom>
+        </p:spPr>
+      </p:pic>
     </p:spTree>
     <p:extLst>
       <p:ext uri="{BB962C8B-B14F-4D97-AF65-F5344CB8AC3E}">

</xml_diff>

<commit_message>
ultime modifiche last minute
</commit_message>
<xml_diff>
--- a/Presentazione/Presentazione Tesi.pptx
+++ b/Presentazione/Presentazione Tesi.pptx
@@ -5,10 +5,10 @@
     <p:sldMasterId id="2147483648" r:id="rId1"/>
   </p:sldMasterIdLst>
   <p:notesMasterIdLst>
-    <p:notesMasterId r:id="rId15"/>
+    <p:notesMasterId r:id="rId14"/>
   </p:notesMasterIdLst>
   <p:handoutMasterIdLst>
-    <p:handoutMasterId r:id="rId16"/>
+    <p:handoutMasterId r:id="rId15"/>
   </p:handoutMasterIdLst>
   <p:sldIdLst>
     <p:sldId id="256" r:id="rId2"/>
@@ -22,8 +22,7 @@
     <p:sldId id="263" r:id="rId10"/>
     <p:sldId id="264" r:id="rId11"/>
     <p:sldId id="265" r:id="rId12"/>
-    <p:sldId id="268" r:id="rId13"/>
-    <p:sldId id="266" r:id="rId14"/>
+    <p:sldId id="266" r:id="rId13"/>
   </p:sldIdLst>
   <p:sldSz cx="12192000" cy="6858000"/>
   <p:notesSz cx="6858000" cy="9144000"/>
@@ -230,7 +229,7 @@
           <a:p>
             <a:fld id="{FE163879-CE96-445E-A2B6-849901B0BD2B}" type="datetimeFigureOut">
               <a:rPr lang="it-IT" smtClean="0"/>
-              <a:t>10/02/2018</a:t>
+              <a:t>12/02/2018</a:t>
             </a:fld>
             <a:endParaRPr lang="it-IT"/>
           </a:p>
@@ -414,7 +413,7 @@
           <a:p>
             <a:fld id="{562C2FC0-2FC2-41AC-93C1-87F9ED04732B}" type="datetimeFigureOut">
               <a:rPr lang="it-IT" smtClean="0"/>
-              <a:t>10/02/2018</a:t>
+              <a:t>12/02/2018</a:t>
             </a:fld>
             <a:endParaRPr lang="it-IT"/>
           </a:p>
@@ -798,67 +797,6 @@
     <p:extLst>
       <p:ext uri="{BB962C8B-B14F-4D97-AF65-F5344CB8AC3E}">
         <p14:creationId xmlns:p14="http://schemas.microsoft.com/office/powerpoint/2010/main" val="1508318476"/>
-      </p:ext>
-    </p:extLst>
-  </p:cSld>
-  <p:clrMapOvr>
-    <a:masterClrMapping/>
-  </p:clrMapOvr>
-</p:notes>
-</file>
-
-<file path=ppt/notesSlides/notesSlide3.xml><?xml version="1.0" encoding="utf-8"?>
-<p:notes xmlns:a="http://schemas.openxmlformats.org/drawingml/2006/main" xmlns:r="http://schemas.openxmlformats.org/officeDocument/2006/relationships" xmlns:p="http://schemas.openxmlformats.org/presentationml/2006/main">
-  <p:cSld>
-    <p:spTree>
-      <p:nvGrpSpPr>
-        <p:cNvPr id="1" name=""/>
-        <p:cNvGrpSpPr/>
-        <p:nvPr/>
-      </p:nvGrpSpPr>
-      <p:grpSpPr>
-        <a:xfrm>
-          <a:off x="0" y="0"/>
-          <a:ext cx="0" cy="0"/>
-          <a:chOff x="0" y="0"/>
-          <a:chExt cx="0" cy="0"/>
-        </a:xfrm>
-      </p:grpSpPr>
-      <p:sp>
-        <p:nvSpPr>
-          <p:cNvPr id="2" name="Segnaposto immagine diapositiva 1"/>
-          <p:cNvSpPr>
-            <a:spLocks noGrp="1" noRot="1" noChangeAspect="1"/>
-          </p:cNvSpPr>
-          <p:nvPr>
-            <p:ph type="sldImg"/>
-          </p:nvPr>
-        </p:nvSpPr>
-        <p:spPr/>
-      </p:sp>
-      <p:sp>
-        <p:nvSpPr>
-          <p:cNvPr id="3" name="Segnaposto note 2"/>
-          <p:cNvSpPr>
-            <a:spLocks noGrp="1"/>
-          </p:cNvSpPr>
-          <p:nvPr>
-            <p:ph type="body" idx="1"/>
-          </p:nvPr>
-        </p:nvSpPr>
-        <p:spPr/>
-        <p:txBody>
-          <a:bodyPr/>
-          <a:lstStyle/>
-          <a:p>
-            <a:endParaRPr lang="it-IT"/>
-          </a:p>
-        </p:txBody>
-      </p:sp>
-    </p:spTree>
-    <p:extLst>
-      <p:ext uri="{BB962C8B-B14F-4D97-AF65-F5344CB8AC3E}">
-        <p14:creationId xmlns:p14="http://schemas.microsoft.com/office/powerpoint/2010/main" val="2400575836"/>
       </p:ext>
     </p:extLst>
   </p:cSld>
@@ -1370,7 +1308,7 @@
           <a:p>
             <a:fld id="{34930167-DF4C-40D2-9168-503C3332A5D8}" type="datetime1">
               <a:rPr lang="en-US" smtClean="0"/>
-              <a:t>2/10/2018</a:t>
+              <a:t>2/12/2018</a:t>
             </a:fld>
             <a:endParaRPr lang="en-US" dirty="0"/>
           </a:p>
@@ -1662,7 +1600,7 @@
           <a:p>
             <a:fld id="{A346BDC6-A4F7-48B6-8CCE-76E74ACD6198}" type="datetime1">
               <a:rPr lang="en-US" smtClean="0"/>
-              <a:t>2/10/2018</a:t>
+              <a:t>2/12/2018</a:t>
             </a:fld>
             <a:endParaRPr lang="en-US" dirty="0"/>
           </a:p>
@@ -1906,7 +1844,7 @@
           <a:p>
             <a:fld id="{39F320CD-6DEF-4D2E-A3B5-A2A1B24C8438}" type="datetime1">
               <a:rPr lang="en-US" smtClean="0"/>
-              <a:t>2/10/2018</a:t>
+              <a:t>2/12/2018</a:t>
             </a:fld>
             <a:endParaRPr lang="en-US" dirty="0"/>
           </a:p>
@@ -2442,7 +2380,7 @@
           <a:p>
             <a:fld id="{31F407CE-E95E-4864-B133-F5EBAD4C6F9E}" type="datetime1">
               <a:rPr lang="en-US" smtClean="0"/>
-              <a:t>2/10/2018</a:t>
+              <a:t>2/12/2018</a:t>
             </a:fld>
             <a:endParaRPr lang="en-US" dirty="0"/>
           </a:p>
@@ -2686,7 +2624,7 @@
           <a:p>
             <a:fld id="{71610C56-8D36-4F10-B545-E00C0BBEA2EC}" type="datetime1">
               <a:rPr lang="en-US" smtClean="0"/>
-              <a:t>2/10/2018</a:t>
+              <a:t>2/12/2018</a:t>
             </a:fld>
             <a:endParaRPr lang="en-US" dirty="0"/>
           </a:p>
@@ -3214,7 +3152,7 @@
           <a:p>
             <a:fld id="{F28EF156-F65C-439A-8B8D-59735B6BFAE5}" type="datetime1">
               <a:rPr lang="en-US" smtClean="0"/>
-              <a:t>2/10/2018</a:t>
+              <a:t>2/12/2018</a:t>
             </a:fld>
             <a:endParaRPr lang="en-US" dirty="0"/>
           </a:p>
@@ -3507,7 +3445,7 @@
           <a:p>
             <a:fld id="{89A7AA60-80BA-45DC-A930-0A1B4B6A8638}" type="datetime1">
               <a:rPr lang="en-US" smtClean="0"/>
-              <a:t>2/10/2018</a:t>
+              <a:t>2/12/2018</a:t>
             </a:fld>
             <a:endParaRPr lang="en-US" dirty="0"/>
           </a:p>
@@ -3677,7 +3615,7 @@
           <a:p>
             <a:fld id="{194FDF5D-8881-4B2F-8CFE-20AED4065027}" type="datetime1">
               <a:rPr lang="en-US" smtClean="0"/>
-              <a:t>2/10/2018</a:t>
+              <a:t>2/12/2018</a:t>
             </a:fld>
             <a:endParaRPr lang="en-US" dirty="0"/>
           </a:p>
@@ -3853,7 +3791,7 @@
           <a:p>
             <a:fld id="{23B3312D-4517-4A4D-A5CF-024829C97DB9}" type="datetime1">
               <a:rPr lang="en-US" smtClean="0"/>
-              <a:t>2/10/2018</a:t>
+              <a:t>2/12/2018</a:t>
             </a:fld>
             <a:endParaRPr lang="en-US" dirty="0"/>
           </a:p>
@@ -4019,7 +3957,7 @@
           <a:p>
             <a:fld id="{B15BFDFA-3865-4540-BF35-609DCBC38D58}" type="datetime1">
               <a:rPr lang="en-US" smtClean="0"/>
-              <a:t>2/10/2018</a:t>
+              <a:t>2/12/2018</a:t>
             </a:fld>
             <a:endParaRPr lang="en-US" dirty="0"/>
           </a:p>
@@ -4266,7 +4204,7 @@
           <a:p>
             <a:fld id="{CCB434CB-032F-4623-8228-19662D8F90E1}" type="datetime1">
               <a:rPr lang="en-US" smtClean="0"/>
-              <a:t>2/10/2018</a:t>
+              <a:t>2/12/2018</a:t>
             </a:fld>
             <a:endParaRPr lang="en-US" dirty="0"/>
           </a:p>
@@ -4559,7 +4497,7 @@
           <a:p>
             <a:fld id="{633ADCCD-1029-4798-8C0A-85F3C96EC984}" type="datetime1">
               <a:rPr lang="en-US" smtClean="0"/>
-              <a:t>2/10/2018</a:t>
+              <a:t>2/12/2018</a:t>
             </a:fld>
             <a:endParaRPr lang="en-US" dirty="0"/>
           </a:p>
@@ -4997,7 +4935,7 @@
           <a:p>
             <a:fld id="{CEA7DB53-7C3F-4A78-BB4A-29D87F11DD80}" type="datetime1">
               <a:rPr lang="en-US" smtClean="0"/>
-              <a:t>2/10/2018</a:t>
+              <a:t>2/12/2018</a:t>
             </a:fld>
             <a:endParaRPr lang="en-US" dirty="0"/>
           </a:p>
@@ -5111,7 +5049,7 @@
           <a:p>
             <a:fld id="{75EAE054-65EF-4CFF-9048-D8FEA7076D29}" type="datetime1">
               <a:rPr lang="en-US" smtClean="0"/>
-              <a:t>2/10/2018</a:t>
+              <a:t>2/12/2018</a:t>
             </a:fld>
             <a:endParaRPr lang="en-US" dirty="0"/>
           </a:p>
@@ -5202,7 +5140,7 @@
           <a:p>
             <a:fld id="{890A4995-8046-45BD-82B8-6B43CBBC1FEC}" type="datetime1">
               <a:rPr lang="en-US" smtClean="0"/>
-              <a:t>2/10/2018</a:t>
+              <a:t>2/12/2018</a:t>
             </a:fld>
             <a:endParaRPr lang="en-US" dirty="0"/>
           </a:p>
@@ -5481,7 +5419,7 @@
           <a:p>
             <a:fld id="{87D938B0-A48A-49D3-AE91-F7DD8C7E7404}" type="datetime1">
               <a:rPr lang="en-US" smtClean="0"/>
-              <a:t>2/10/2018</a:t>
+              <a:t>2/12/2018</a:t>
             </a:fld>
             <a:endParaRPr lang="en-US" dirty="0"/>
           </a:p>
@@ -5768,7 +5706,7 @@
           <a:p>
             <a:fld id="{04BB25BF-EE20-45BD-B888-C5E031B6A489}" type="datetime1">
               <a:rPr lang="en-US" smtClean="0"/>
-              <a:t>2/10/2018</a:t>
+              <a:t>2/12/2018</a:t>
             </a:fld>
             <a:endParaRPr lang="en-US" dirty="0"/>
           </a:p>
@@ -6294,7 +6232,7 @@
           <a:p>
             <a:fld id="{C9176751-DB5A-487D-8F56-28338F6FC7C1}" type="datetime1">
               <a:rPr lang="en-US" smtClean="0"/>
-              <a:t>2/10/2018</a:t>
+              <a:t>2/12/2018</a:t>
             </a:fld>
             <a:endParaRPr lang="en-US" dirty="0"/>
           </a:p>
@@ -7654,7 +7592,7 @@
           <p:nvPr>
             <p:extLst>
               <p:ext uri="{D42A27DB-BD31-4B8C-83A1-F6EECF244321}">
-                <p14:modId xmlns:p14="http://schemas.microsoft.com/office/powerpoint/2010/main" val="2274910899"/>
+                <p14:modId xmlns:p14="http://schemas.microsoft.com/office/powerpoint/2010/main" val="1295768170"/>
               </p:ext>
             </p:extLst>
           </p:nvPr>
@@ -10207,14 +10145,14 @@
                     <a:p>
                       <a:pPr algn="l" fontAlgn="b"/>
                       <a:r>
-                        <a:rPr lang="it-IT" sz="1400" b="0" i="0" u="none" strike="noStrike">
+                        <a:rPr lang="it-IT" sz="1400" b="0" i="0" u="none" strike="noStrike" dirty="0">
                           <a:solidFill>
                             <a:srgbClr val="000000"/>
                           </a:solidFill>
                           <a:effectLst/>
                           <a:latin typeface="Calibri" panose="020F0502020204030204" pitchFamily="34" charset="0"/>
                         </a:rPr>
-                        <a:t>20</a:t>
+                        <a:t>20 </a:t>
                       </a:r>
                     </a:p>
                   </a:txBody>
@@ -10245,7 +10183,17 @@
                     <a:lstStyle/>
                     <a:p>
                       <a:pPr algn="l" fontAlgn="b"/>
-                      <a:endParaRPr lang="it-IT" sz="1400" b="0" i="0" u="none" strike="noStrike">
+                      <a:r>
+                        <a:rPr lang="it-IT" sz="1400" b="0" i="0" u="none" strike="noStrike" dirty="0" err="1">
+                          <a:solidFill>
+                            <a:srgbClr val="000000"/>
+                          </a:solidFill>
+                          <a:effectLst/>
+                          <a:latin typeface="Calibri" panose="020F0502020204030204" pitchFamily="34" charset="0"/>
+                        </a:rPr>
+                        <a:t>ms</a:t>
+                      </a:r>
+                      <a:endParaRPr lang="it-IT" sz="1400" b="0" i="0" u="none" strike="noStrike" dirty="0">
                         <a:solidFill>
                           <a:srgbClr val="000000"/>
                         </a:solidFill>
@@ -13382,7 +13330,17 @@
                     <a:lstStyle/>
                     <a:p>
                       <a:pPr algn="l" fontAlgn="b"/>
-                      <a:endParaRPr lang="it-IT" sz="1400" b="0" i="0" u="none" strike="noStrike">
+                      <a:r>
+                        <a:rPr lang="it-IT" sz="1400" b="0" i="0" u="none" strike="noStrike" dirty="0" err="1">
+                          <a:solidFill>
+                            <a:srgbClr val="000000"/>
+                          </a:solidFill>
+                          <a:effectLst/>
+                          <a:latin typeface="Calibri" panose="020F0502020204030204" pitchFamily="34" charset="0"/>
+                        </a:rPr>
+                        <a:t>ms</a:t>
+                      </a:r>
+                      <a:endParaRPr lang="it-IT" sz="1400" b="0" i="0" u="none" strike="noStrike" dirty="0">
                         <a:solidFill>
                           <a:srgbClr val="000000"/>
                         </a:solidFill>
@@ -16177,7 +16135,17 @@
                     <a:lstStyle/>
                     <a:p>
                       <a:pPr algn="l" fontAlgn="b"/>
-                      <a:endParaRPr lang="it-IT" sz="1400" b="0" i="0" u="none" strike="noStrike">
+                      <a:r>
+                        <a:rPr lang="it-IT" sz="1400" b="0" i="0" u="none" strike="noStrike" dirty="0" err="1">
+                          <a:solidFill>
+                            <a:srgbClr val="000000"/>
+                          </a:solidFill>
+                          <a:effectLst/>
+                          <a:latin typeface="Calibri" panose="020F0502020204030204" pitchFamily="34" charset="0"/>
+                        </a:rPr>
+                        <a:t>ms</a:t>
+                      </a:r>
+                      <a:endParaRPr lang="it-IT" sz="1400" b="0" i="0" u="none" strike="noStrike" dirty="0">
                         <a:solidFill>
                           <a:srgbClr val="000000"/>
                         </a:solidFill>
@@ -18946,14 +18914,14 @@
                     <a:p>
                       <a:pPr algn="l" fontAlgn="b"/>
                       <a:r>
-                        <a:rPr lang="it-IT" sz="1400" b="0" i="0" u="none" strike="noStrike">
+                        <a:rPr lang="it-IT" sz="1400" b="0" i="0" u="none" strike="noStrike" dirty="0">
                           <a:solidFill>
                             <a:srgbClr val="000000"/>
                           </a:solidFill>
                           <a:effectLst/>
                           <a:latin typeface="Calibri" panose="020F0502020204030204" pitchFamily="34" charset="0"/>
                         </a:rPr>
-                        <a:t>1825</a:t>
+                        <a:t>1825 </a:t>
                       </a:r>
                     </a:p>
                   </a:txBody>
@@ -18994,7 +18962,17 @@
                     <a:lstStyle/>
                     <a:p>
                       <a:pPr algn="l" fontAlgn="b"/>
-                      <a:endParaRPr lang="it-IT" sz="1400" b="0" i="0" u="none" strike="noStrike">
+                      <a:r>
+                        <a:rPr lang="it-IT" sz="1400" b="0" i="0" u="none" strike="noStrike" dirty="0" err="1">
+                          <a:solidFill>
+                            <a:srgbClr val="000000"/>
+                          </a:solidFill>
+                          <a:effectLst/>
+                          <a:latin typeface="Calibri" panose="020F0502020204030204" pitchFamily="34" charset="0"/>
+                        </a:rPr>
+                        <a:t>ms</a:t>
+                      </a:r>
+                      <a:endParaRPr lang="it-IT" sz="1400" b="0" i="0" u="none" strike="noStrike" dirty="0">
                         <a:solidFill>
                           <a:srgbClr val="000000"/>
                         </a:solidFill>
@@ -19066,7 +19044,7 @@
                     <a:lstStyle/>
                     <a:p>
                       <a:pPr algn="l" fontAlgn="b"/>
-                      <a:endParaRPr lang="it-IT" sz="1400" b="0" i="0" u="none" strike="noStrike">
+                      <a:endParaRPr lang="it-IT" sz="1400" b="0" i="0" u="none" strike="noStrike" dirty="0">
                         <a:solidFill>
                           <a:srgbClr val="000000"/>
                         </a:solidFill>
@@ -20267,7 +20245,7 @@
                     <a:lstStyle/>
                     <a:p>
                       <a:pPr algn="l" fontAlgn="b"/>
-                      <a:endParaRPr lang="it-IT" sz="1400" b="0" i="0" u="none" strike="noStrike">
+                      <a:endParaRPr lang="it-IT" sz="1400" b="0" i="0" u="none" strike="noStrike" dirty="0">
                         <a:solidFill>
                           <a:srgbClr val="000000"/>
                         </a:solidFill>
@@ -21400,7 +21378,17 @@
                     <a:lstStyle/>
                     <a:p>
                       <a:pPr algn="l" fontAlgn="b"/>
-                      <a:endParaRPr lang="it-IT" sz="1400" b="0" i="0" u="none" strike="noStrike">
+                      <a:r>
+                        <a:rPr lang="it-IT" sz="1400" b="0" i="0" u="none" strike="noStrike" dirty="0" err="1">
+                          <a:solidFill>
+                            <a:srgbClr val="000000"/>
+                          </a:solidFill>
+                          <a:effectLst/>
+                          <a:latin typeface="Calibri" panose="020F0502020204030204" pitchFamily="34" charset="0"/>
+                        </a:rPr>
+                        <a:t>ms</a:t>
+                      </a:r>
+                      <a:endParaRPr lang="it-IT" sz="1400" b="0" i="0" u="none" strike="noStrike" dirty="0">
                         <a:solidFill>
                           <a:srgbClr val="000000"/>
                         </a:solidFill>
@@ -22577,7 +22565,7 @@
                     <a:lstStyle/>
                     <a:p>
                       <a:pPr algn="l" fontAlgn="b"/>
-                      <a:endParaRPr lang="it-IT" sz="1400" b="0" i="0" u="none" strike="noStrike">
+                      <a:endParaRPr lang="it-IT" sz="1400" b="0" i="0" u="none" strike="noStrike" dirty="0">
                         <a:solidFill>
                           <a:srgbClr val="000000"/>
                         </a:solidFill>
@@ -23710,7 +23698,17 @@
                     <a:lstStyle/>
                     <a:p>
                       <a:pPr algn="l" fontAlgn="b"/>
-                      <a:endParaRPr lang="it-IT" sz="1400" b="0" i="0" u="none" strike="noStrike">
+                      <a:r>
+                        <a:rPr lang="it-IT" sz="1400" b="0" i="0" u="none" strike="noStrike" dirty="0" err="1">
+                          <a:solidFill>
+                            <a:srgbClr val="000000"/>
+                          </a:solidFill>
+                          <a:effectLst/>
+                          <a:latin typeface="Calibri" panose="020F0502020204030204" pitchFamily="34" charset="0"/>
+                        </a:rPr>
+                        <a:t>ms</a:t>
+                      </a:r>
+                      <a:endParaRPr lang="it-IT" sz="1400" b="0" i="0" u="none" strike="noStrike" dirty="0">
                         <a:solidFill>
                           <a:srgbClr val="000000"/>
                         </a:solidFill>
@@ -26020,7 +26018,17 @@
                     <a:lstStyle/>
                     <a:p>
                       <a:pPr algn="l" fontAlgn="b"/>
-                      <a:endParaRPr lang="it-IT" sz="1400" b="0" i="0" u="none" strike="noStrike">
+                      <a:r>
+                        <a:rPr lang="it-IT" sz="1400" b="0" i="0" u="none" strike="noStrike" dirty="0" err="1">
+                          <a:solidFill>
+                            <a:srgbClr val="000000"/>
+                          </a:solidFill>
+                          <a:effectLst/>
+                          <a:latin typeface="Calibri" panose="020F0502020204030204" pitchFamily="34" charset="0"/>
+                        </a:rPr>
+                        <a:t>ms</a:t>
+                      </a:r>
+                      <a:endParaRPr lang="it-IT" sz="1400" b="0" i="0" u="none" strike="noStrike" dirty="0">
                         <a:solidFill>
                           <a:srgbClr val="000000"/>
                         </a:solidFill>
@@ -28330,7 +28338,17 @@
                     <a:lstStyle/>
                     <a:p>
                       <a:pPr algn="l" fontAlgn="b"/>
-                      <a:endParaRPr lang="it-IT" sz="1400" b="0" i="0" u="none" strike="noStrike">
+                      <a:r>
+                        <a:rPr lang="it-IT" sz="1400" b="0" i="0" u="none" strike="noStrike" dirty="0" err="1">
+                          <a:solidFill>
+                            <a:srgbClr val="000000"/>
+                          </a:solidFill>
+                          <a:effectLst/>
+                          <a:latin typeface="Calibri" panose="020F0502020204030204" pitchFamily="34" charset="0"/>
+                        </a:rPr>
+                        <a:t>ms</a:t>
+                      </a:r>
+                      <a:endParaRPr lang="it-IT" sz="1400" b="0" i="0" u="none" strike="noStrike" dirty="0">
                         <a:solidFill>
                           <a:srgbClr val="000000"/>
                         </a:solidFill>
@@ -30640,7 +30658,17 @@
                     <a:lstStyle/>
                     <a:p>
                       <a:pPr algn="l" fontAlgn="b"/>
-                      <a:endParaRPr lang="it-IT" sz="1400" b="0" i="0" u="none" strike="noStrike">
+                      <a:r>
+                        <a:rPr lang="it-IT" sz="1400" b="0" i="0" u="none" strike="noStrike" dirty="0" err="1">
+                          <a:solidFill>
+                            <a:srgbClr val="000000"/>
+                          </a:solidFill>
+                          <a:effectLst/>
+                          <a:latin typeface="Calibri" panose="020F0502020204030204" pitchFamily="34" charset="0"/>
+                        </a:rPr>
+                        <a:t>ms</a:t>
+                      </a:r>
+                      <a:endParaRPr lang="it-IT" sz="1400" b="0" i="0" u="none" strike="noStrike" dirty="0">
                         <a:solidFill>
                           <a:srgbClr val="000000"/>
                         </a:solidFill>
@@ -32950,7 +32978,17 @@
                     <a:lstStyle/>
                     <a:p>
                       <a:pPr algn="l" fontAlgn="b"/>
-                      <a:endParaRPr lang="it-IT" sz="1400" b="0" i="0" u="none" strike="noStrike">
+                      <a:r>
+                        <a:rPr lang="it-IT" sz="1400" b="0" i="0" u="none" strike="noStrike" dirty="0" err="1">
+                          <a:solidFill>
+                            <a:srgbClr val="000000"/>
+                          </a:solidFill>
+                          <a:effectLst/>
+                          <a:latin typeface="Calibri" panose="020F0502020204030204" pitchFamily="34" charset="0"/>
+                        </a:rPr>
+                        <a:t>ms</a:t>
+                      </a:r>
+                      <a:endParaRPr lang="it-IT" sz="1400" b="0" i="0" u="none" strike="noStrike" dirty="0">
                         <a:solidFill>
                           <a:srgbClr val="000000"/>
                         </a:solidFill>
@@ -35260,7 +35298,17 @@
                     <a:lstStyle/>
                     <a:p>
                       <a:pPr algn="l" fontAlgn="b"/>
-                      <a:endParaRPr lang="it-IT" sz="1400" b="0" i="0" u="none" strike="noStrike">
+                      <a:r>
+                        <a:rPr lang="it-IT" sz="1400" b="0" i="0" u="none" strike="noStrike" dirty="0" err="1">
+                          <a:solidFill>
+                            <a:srgbClr val="000000"/>
+                          </a:solidFill>
+                          <a:effectLst/>
+                          <a:latin typeface="Calibri" panose="020F0502020204030204" pitchFamily="34" charset="0"/>
+                        </a:rPr>
+                        <a:t>ms</a:t>
+                      </a:r>
+                      <a:endParaRPr lang="it-IT" sz="1400" b="0" i="0" u="none" strike="noStrike" dirty="0">
                         <a:solidFill>
                           <a:srgbClr val="000000"/>
                         </a:solidFill>
@@ -37969,7 +38017,7 @@
                 <a:ea typeface="Verdana" panose="020B0604030504040204" pitchFamily="34" charset="0"/>
                 <a:cs typeface="Verdana" panose="020B0604030504040204" pitchFamily="34" charset="0"/>
               </a:rPr>
-              <a:t> per implementare un attacco Man in the Middle a dispositivi Bluetooth Low Energy</a:t>
+              <a:t> per implementare un attacco Man in the Middle a dispositivi Bluetooth Low Energy.</a:t>
             </a:r>
           </a:p>
           <a:p>
@@ -38188,689 +38236,6 @@
 </file>
 
 <file path=ppt/slides/slide12.xml><?xml version="1.0" encoding="utf-8"?>
-<p:sld xmlns:a="http://schemas.openxmlformats.org/drawingml/2006/main" xmlns:r="http://schemas.openxmlformats.org/officeDocument/2006/relationships" xmlns:p="http://schemas.openxmlformats.org/presentationml/2006/main">
-  <p:cSld>
-    <p:spTree>
-      <p:nvGrpSpPr>
-        <p:cNvPr id="1" name=""/>
-        <p:cNvGrpSpPr/>
-        <p:nvPr/>
-      </p:nvGrpSpPr>
-      <p:grpSpPr>
-        <a:xfrm>
-          <a:off x="0" y="0"/>
-          <a:ext cx="0" cy="0"/>
-          <a:chOff x="0" y="0"/>
-          <a:chExt cx="0" cy="0"/>
-        </a:xfrm>
-      </p:grpSpPr>
-      <p:sp>
-        <p:nvSpPr>
-          <p:cNvPr id="7" name="Rettangolo 6">
-            <a:extLst>
-              <a:ext uri="{FF2B5EF4-FFF2-40B4-BE49-F238E27FC236}">
-                <a16:creationId xmlns:a16="http://schemas.microsoft.com/office/drawing/2014/main" id="{59EB0834-3781-49FC-B825-95B2CD20427F}"/>
-              </a:ext>
-            </a:extLst>
-          </p:cNvPr>
-          <p:cNvSpPr/>
-          <p:nvPr/>
-        </p:nvSpPr>
-        <p:spPr>
-          <a:xfrm>
-            <a:off x="6539018" y="2311306"/>
-            <a:ext cx="4763386" cy="4410642"/>
-          </a:xfrm>
-          <a:prstGeom prst="rect">
-            <a:avLst/>
-          </a:prstGeom>
-          <a:solidFill>
-            <a:srgbClr val="1287C3"/>
-          </a:solidFill>
-          <a:ln>
-            <a:solidFill>
-              <a:srgbClr val="DFE1E2"/>
-            </a:solidFill>
-          </a:ln>
-        </p:spPr>
-        <p:style>
-          <a:lnRef idx="2">
-            <a:schemeClr val="accent1">
-              <a:shade val="50000"/>
-            </a:schemeClr>
-          </a:lnRef>
-          <a:fillRef idx="1">
-            <a:schemeClr val="accent1"/>
-          </a:fillRef>
-          <a:effectRef idx="0">
-            <a:schemeClr val="accent1"/>
-          </a:effectRef>
-          <a:fontRef idx="minor">
-            <a:schemeClr val="lt1"/>
-          </a:fontRef>
-        </p:style>
-        <p:txBody>
-          <a:bodyPr rtlCol="0" anchor="ctr"/>
-          <a:lstStyle/>
-          <a:p>
-            <a:pPr algn="ctr"/>
-            <a:endParaRPr lang="it-IT" dirty="0">
-              <a:solidFill>
-                <a:srgbClr val="1287C3"/>
-              </a:solidFill>
-            </a:endParaRPr>
-          </a:p>
-        </p:txBody>
-      </p:sp>
-      <p:sp>
-        <p:nvSpPr>
-          <p:cNvPr id="2" name="Titolo 1">
-            <a:extLst>
-              <a:ext uri="{FF2B5EF4-FFF2-40B4-BE49-F238E27FC236}">
-                <a16:creationId xmlns:a16="http://schemas.microsoft.com/office/drawing/2014/main" id="{1FD88AD1-82A9-4084-86A4-8B3314BA96FE}"/>
-              </a:ext>
-            </a:extLst>
-          </p:cNvPr>
-          <p:cNvSpPr>
-            <a:spLocks noGrp="1"/>
-          </p:cNvSpPr>
-          <p:nvPr>
-            <p:ph type="ctrTitle"/>
-          </p:nvPr>
-        </p:nvSpPr>
-        <p:spPr>
-          <a:xfrm>
-            <a:off x="6539018" y="2427644"/>
-            <a:ext cx="4763386" cy="2178097"/>
-          </a:xfrm>
-        </p:spPr>
-        <p:txBody>
-          <a:bodyPr>
-            <a:noAutofit/>
-          </a:bodyPr>
-          <a:lstStyle/>
-          <a:p>
-            <a:pPr algn="ctr"/>
-            <a:r>
-              <a:rPr lang="it-IT" sz="3000" b="1" dirty="0">
-                <a:ln w="3175" cmpd="sng">
-                  <a:solidFill>
-                    <a:srgbClr val="C1C5C6">
-                      <a:alpha val="64000"/>
-                    </a:srgbClr>
-                  </a:solidFill>
-                </a:ln>
-                <a:solidFill>
-                  <a:srgbClr val="CCCFD0"/>
-                </a:solidFill>
-                <a:effectLst>
-                  <a:outerShdw blurRad="38100" dist="38100" dir="2700000" algn="tl">
-                    <a:srgbClr val="000000">
-                      <a:alpha val="43137"/>
-                    </a:srgbClr>
-                  </a:outerShdw>
-                </a:effectLst>
-                <a:latin typeface="Verdana" panose="020B0604030504040204" pitchFamily="34" charset="0"/>
-                <a:ea typeface="Verdana" panose="020B0604030504040204" pitchFamily="34" charset="0"/>
-                <a:cs typeface="Verdana" panose="020B0604030504040204" pitchFamily="34" charset="0"/>
-              </a:rPr>
-              <a:t>SISTEMI FLESSIBILI PER LA CATTURA DI TRAFFICO BLUETOOTH</a:t>
-            </a:r>
-          </a:p>
-        </p:txBody>
-      </p:sp>
-      <p:sp>
-        <p:nvSpPr>
-          <p:cNvPr id="4" name="Sottotitolo 2">
-            <a:extLst>
-              <a:ext uri="{FF2B5EF4-FFF2-40B4-BE49-F238E27FC236}">
-                <a16:creationId xmlns:a16="http://schemas.microsoft.com/office/drawing/2014/main" id="{1B4720C1-CB83-4C71-B8C4-00541B523A68}"/>
-              </a:ext>
-            </a:extLst>
-          </p:cNvPr>
-          <p:cNvSpPr txBox="1">
-            <a:spLocks/>
-          </p:cNvSpPr>
-          <p:nvPr/>
-        </p:nvSpPr>
-        <p:spPr>
-          <a:xfrm>
-            <a:off x="6539018" y="5154570"/>
-            <a:ext cx="2573081" cy="1966383"/>
-          </a:xfrm>
-          <a:prstGeom prst="rect">
-            <a:avLst/>
-          </a:prstGeom>
-        </p:spPr>
-        <p:txBody>
-          <a:bodyPr vert="horz" lIns="91440" tIns="45720" rIns="91440" bIns="45720" rtlCol="0" anchor="t">
-            <a:normAutofit/>
-          </a:bodyPr>
-          <a:lstStyle>
-            <a:lvl1pPr marL="0" indent="0" algn="r" defTabSz="457200" rtl="0" eaLnBrk="1" latinLnBrk="0" hangingPunct="1">
-              <a:spcBef>
-                <a:spcPct val="20000"/>
-              </a:spcBef>
-              <a:spcAft>
-                <a:spcPts val="600"/>
-              </a:spcAft>
-              <a:buClr>
-                <a:schemeClr val="accent1">
-                  <a:lumMod val="75000"/>
-                </a:schemeClr>
-              </a:buClr>
-              <a:buSzPct val="145000"/>
-              <a:buFont typeface="Arial"/>
-              <a:buNone/>
-              <a:defRPr sz="2100" kern="1200" cap="none">
-                <a:solidFill>
-                  <a:schemeClr val="tx1"/>
-                </a:solidFill>
-                <a:effectLst/>
-                <a:latin typeface="+mn-lt"/>
-                <a:ea typeface="+mn-ea"/>
-                <a:cs typeface="+mn-cs"/>
-              </a:defRPr>
-            </a:lvl1pPr>
-            <a:lvl2pPr marL="457200" indent="0" algn="ctr" defTabSz="457200" rtl="0" eaLnBrk="1" latinLnBrk="0" hangingPunct="1">
-              <a:spcBef>
-                <a:spcPct val="20000"/>
-              </a:spcBef>
-              <a:spcAft>
-                <a:spcPts val="600"/>
-              </a:spcAft>
-              <a:buClr>
-                <a:schemeClr val="accent1">
-                  <a:lumMod val="75000"/>
-                </a:schemeClr>
-              </a:buClr>
-              <a:buSzPct val="145000"/>
-              <a:buFont typeface="Arial"/>
-              <a:buNone/>
-              <a:defRPr sz="2000" kern="1200" cap="none">
-                <a:solidFill>
-                  <a:schemeClr val="tx1">
-                    <a:tint val="75000"/>
-                  </a:schemeClr>
-                </a:solidFill>
-                <a:effectLst/>
-                <a:latin typeface="+mn-lt"/>
-                <a:ea typeface="+mn-ea"/>
-                <a:cs typeface="+mn-cs"/>
-              </a:defRPr>
-            </a:lvl2pPr>
-            <a:lvl3pPr marL="914400" indent="0" algn="ctr" defTabSz="457200" rtl="0" eaLnBrk="1" latinLnBrk="0" hangingPunct="1">
-              <a:spcBef>
-                <a:spcPct val="20000"/>
-              </a:spcBef>
-              <a:spcAft>
-                <a:spcPts val="600"/>
-              </a:spcAft>
-              <a:buClr>
-                <a:schemeClr val="accent1">
-                  <a:lumMod val="75000"/>
-                </a:schemeClr>
-              </a:buClr>
-              <a:buSzPct val="145000"/>
-              <a:buFont typeface="Arial"/>
-              <a:buNone/>
-              <a:defRPr sz="1800" kern="1200" cap="none">
-                <a:solidFill>
-                  <a:schemeClr val="tx1">
-                    <a:tint val="75000"/>
-                  </a:schemeClr>
-                </a:solidFill>
-                <a:effectLst/>
-                <a:latin typeface="+mn-lt"/>
-                <a:ea typeface="+mn-ea"/>
-                <a:cs typeface="+mn-cs"/>
-              </a:defRPr>
-            </a:lvl3pPr>
-            <a:lvl4pPr marL="1371600" indent="0" algn="ctr" defTabSz="457200" rtl="0" eaLnBrk="1" latinLnBrk="0" hangingPunct="1">
-              <a:spcBef>
-                <a:spcPct val="20000"/>
-              </a:spcBef>
-              <a:spcAft>
-                <a:spcPts val="600"/>
-              </a:spcAft>
-              <a:buClr>
-                <a:schemeClr val="accent1">
-                  <a:lumMod val="75000"/>
-                </a:schemeClr>
-              </a:buClr>
-              <a:buSzPct val="145000"/>
-              <a:buFont typeface="Arial"/>
-              <a:buNone/>
-              <a:defRPr sz="1600" kern="1200" cap="none">
-                <a:solidFill>
-                  <a:schemeClr val="tx1">
-                    <a:tint val="75000"/>
-                  </a:schemeClr>
-                </a:solidFill>
-                <a:effectLst/>
-                <a:latin typeface="+mn-lt"/>
-                <a:ea typeface="+mn-ea"/>
-                <a:cs typeface="+mn-cs"/>
-              </a:defRPr>
-            </a:lvl4pPr>
-            <a:lvl5pPr marL="1828800" indent="0" algn="ctr" defTabSz="457200" rtl="0" eaLnBrk="1" latinLnBrk="0" hangingPunct="1">
-              <a:spcBef>
-                <a:spcPct val="20000"/>
-              </a:spcBef>
-              <a:spcAft>
-                <a:spcPts val="600"/>
-              </a:spcAft>
-              <a:buClr>
-                <a:schemeClr val="accent1">
-                  <a:lumMod val="75000"/>
-                </a:schemeClr>
-              </a:buClr>
-              <a:buSzPct val="145000"/>
-              <a:buFont typeface="Arial"/>
-              <a:buNone/>
-              <a:defRPr sz="1400" kern="1200" cap="none">
-                <a:solidFill>
-                  <a:schemeClr val="tx1">
-                    <a:tint val="75000"/>
-                  </a:schemeClr>
-                </a:solidFill>
-                <a:effectLst/>
-                <a:latin typeface="+mn-lt"/>
-                <a:ea typeface="+mn-ea"/>
-                <a:cs typeface="+mn-cs"/>
-              </a:defRPr>
-            </a:lvl5pPr>
-            <a:lvl6pPr marL="2286000" indent="0" algn="ctr" defTabSz="457200" rtl="0" eaLnBrk="1" latinLnBrk="0" hangingPunct="1">
-              <a:spcBef>
-                <a:spcPct val="20000"/>
-              </a:spcBef>
-              <a:spcAft>
-                <a:spcPts val="600"/>
-              </a:spcAft>
-              <a:buClr>
-                <a:schemeClr val="accent1">
-                  <a:lumMod val="75000"/>
-                </a:schemeClr>
-              </a:buClr>
-              <a:buSzPct val="145000"/>
-              <a:buFont typeface="Arial"/>
-              <a:buNone/>
-              <a:defRPr sz="1400" kern="1200" cap="none">
-                <a:solidFill>
-                  <a:schemeClr val="tx1">
-                    <a:tint val="75000"/>
-                  </a:schemeClr>
-                </a:solidFill>
-                <a:effectLst/>
-                <a:latin typeface="+mn-lt"/>
-                <a:ea typeface="+mn-ea"/>
-                <a:cs typeface="+mn-cs"/>
-              </a:defRPr>
-            </a:lvl6pPr>
-            <a:lvl7pPr marL="2743200" indent="0" algn="ctr" defTabSz="457200" rtl="0" eaLnBrk="1" latinLnBrk="0" hangingPunct="1">
-              <a:spcBef>
-                <a:spcPct val="20000"/>
-              </a:spcBef>
-              <a:spcAft>
-                <a:spcPts val="600"/>
-              </a:spcAft>
-              <a:buClr>
-                <a:schemeClr val="accent1">
-                  <a:lumMod val="75000"/>
-                </a:schemeClr>
-              </a:buClr>
-              <a:buSzPct val="145000"/>
-              <a:buFont typeface="Arial"/>
-              <a:buNone/>
-              <a:defRPr sz="1400" kern="1200" cap="none">
-                <a:solidFill>
-                  <a:schemeClr val="tx1">
-                    <a:tint val="75000"/>
-                  </a:schemeClr>
-                </a:solidFill>
-                <a:effectLst/>
-                <a:latin typeface="+mn-lt"/>
-                <a:ea typeface="+mn-ea"/>
-                <a:cs typeface="+mn-cs"/>
-              </a:defRPr>
-            </a:lvl7pPr>
-            <a:lvl8pPr marL="3200400" indent="0" algn="ctr" defTabSz="457200" rtl="0" eaLnBrk="1" latinLnBrk="0" hangingPunct="1">
-              <a:spcBef>
-                <a:spcPct val="20000"/>
-              </a:spcBef>
-              <a:spcAft>
-                <a:spcPts val="600"/>
-              </a:spcAft>
-              <a:buClr>
-                <a:schemeClr val="accent1">
-                  <a:lumMod val="75000"/>
-                </a:schemeClr>
-              </a:buClr>
-              <a:buSzPct val="145000"/>
-              <a:buFont typeface="Arial"/>
-              <a:buNone/>
-              <a:defRPr sz="1400" kern="1200" cap="none">
-                <a:solidFill>
-                  <a:schemeClr val="tx1">
-                    <a:tint val="75000"/>
-                  </a:schemeClr>
-                </a:solidFill>
-                <a:effectLst/>
-                <a:latin typeface="+mn-lt"/>
-                <a:ea typeface="+mn-ea"/>
-                <a:cs typeface="+mn-cs"/>
-              </a:defRPr>
-            </a:lvl8pPr>
-            <a:lvl9pPr marL="3657600" indent="0" algn="ctr" defTabSz="457200" rtl="0" eaLnBrk="1" latinLnBrk="0" hangingPunct="1">
-              <a:spcBef>
-                <a:spcPct val="20000"/>
-              </a:spcBef>
-              <a:spcAft>
-                <a:spcPts val="600"/>
-              </a:spcAft>
-              <a:buClr>
-                <a:schemeClr val="accent1">
-                  <a:lumMod val="75000"/>
-                </a:schemeClr>
-              </a:buClr>
-              <a:buSzPct val="145000"/>
-              <a:buFont typeface="Arial"/>
-              <a:buNone/>
-              <a:defRPr sz="1400" kern="1200" cap="none">
-                <a:solidFill>
-                  <a:schemeClr val="tx1">
-                    <a:tint val="75000"/>
-                  </a:schemeClr>
-                </a:solidFill>
-                <a:effectLst/>
-                <a:latin typeface="+mn-lt"/>
-                <a:ea typeface="+mn-ea"/>
-                <a:cs typeface="+mn-cs"/>
-              </a:defRPr>
-            </a:lvl9pPr>
-          </a:lstStyle>
-          <a:p>
-            <a:pPr algn="l"/>
-            <a:r>
-              <a:rPr lang="it-IT" dirty="0">
-                <a:solidFill>
-                  <a:srgbClr val="262626"/>
-                </a:solidFill>
-                <a:latin typeface="Siemens Sans SC Black" pitchFamily="2" charset="0"/>
-              </a:rPr>
-              <a:t>Candidato:</a:t>
-            </a:r>
-          </a:p>
-          <a:p>
-            <a:pPr algn="l"/>
-            <a:r>
-              <a:rPr lang="it-IT" dirty="0">
-                <a:solidFill>
-                  <a:srgbClr val="262626"/>
-                </a:solidFill>
-                <a:latin typeface="Siemens Sans SC Black" pitchFamily="2" charset="0"/>
-              </a:rPr>
-              <a:t>Matricola:</a:t>
-            </a:r>
-          </a:p>
-          <a:p>
-            <a:pPr algn="l"/>
-            <a:r>
-              <a:rPr lang="it-IT" dirty="0">
-                <a:solidFill>
-                  <a:srgbClr val="262626"/>
-                </a:solidFill>
-                <a:latin typeface="Siemens Sans SC Black" pitchFamily="2" charset="0"/>
-              </a:rPr>
-              <a:t>Relatore:</a:t>
-            </a:r>
-          </a:p>
-          <a:p>
-            <a:pPr algn="l"/>
-            <a:endParaRPr lang="it-IT" dirty="0">
-              <a:solidFill>
-                <a:srgbClr val="262626"/>
-              </a:solidFill>
-              <a:latin typeface="Siemens Sans SC Black" pitchFamily="2" charset="0"/>
-            </a:endParaRPr>
-          </a:p>
-        </p:txBody>
-      </p:sp>
-      <p:sp>
-        <p:nvSpPr>
-          <p:cNvPr id="3" name="Sottotitolo 2">
-            <a:extLst>
-              <a:ext uri="{FF2B5EF4-FFF2-40B4-BE49-F238E27FC236}">
-                <a16:creationId xmlns:a16="http://schemas.microsoft.com/office/drawing/2014/main" id="{F80B78DE-10A3-4B8A-857C-9533279E2137}"/>
-              </a:ext>
-            </a:extLst>
-          </p:cNvPr>
-          <p:cNvSpPr>
-            <a:spLocks noGrp="1"/>
-          </p:cNvSpPr>
-          <p:nvPr>
-            <p:ph type="subTitle" idx="1"/>
-          </p:nvPr>
-        </p:nvSpPr>
-        <p:spPr>
-          <a:xfrm>
-            <a:off x="8446770" y="5154570"/>
-            <a:ext cx="2855637" cy="1966383"/>
-          </a:xfrm>
-        </p:spPr>
-        <p:txBody>
-          <a:bodyPr>
-            <a:normAutofit/>
-          </a:bodyPr>
-          <a:lstStyle/>
-          <a:p>
-            <a:r>
-              <a:rPr lang="it-IT" sz="2000" dirty="0">
-                <a:solidFill>
-                  <a:srgbClr val="262626"/>
-                </a:solidFill>
-                <a:latin typeface="Verdana" panose="020B0604030504040204" pitchFamily="34" charset="0"/>
-                <a:ea typeface="Verdana" panose="020B0604030504040204" pitchFamily="34" charset="0"/>
-                <a:cs typeface="Verdana" panose="020B0604030504040204" pitchFamily="34" charset="0"/>
-              </a:rPr>
-              <a:t>Stefano Orioli</a:t>
-            </a:r>
-          </a:p>
-          <a:p>
-            <a:r>
-              <a:rPr lang="it-IT" sz="2000" dirty="0">
-                <a:solidFill>
-                  <a:srgbClr val="262626"/>
-                </a:solidFill>
-                <a:latin typeface="Verdana" panose="020B0604030504040204" pitchFamily="34" charset="0"/>
-                <a:ea typeface="Verdana" panose="020B0604030504040204" pitchFamily="34" charset="0"/>
-                <a:cs typeface="Verdana" panose="020B0604030504040204" pitchFamily="34" charset="0"/>
-              </a:rPr>
-              <a:t>72452</a:t>
-            </a:r>
-          </a:p>
-          <a:p>
-            <a:r>
-              <a:rPr lang="it-IT" sz="2000" dirty="0">
-                <a:solidFill>
-                  <a:srgbClr val="262626"/>
-                </a:solidFill>
-                <a:latin typeface="Verdana" panose="020B0604030504040204" pitchFamily="34" charset="0"/>
-                <a:ea typeface="Verdana" panose="020B0604030504040204" pitchFamily="34" charset="0"/>
-                <a:cs typeface="Verdana" panose="020B0604030504040204" pitchFamily="34" charset="0"/>
-              </a:rPr>
-              <a:t>Francesco Gringoli</a:t>
-            </a:r>
-          </a:p>
-          <a:p>
-            <a:endParaRPr lang="it-IT" sz="2000" dirty="0">
-              <a:solidFill>
-                <a:srgbClr val="262626"/>
-              </a:solidFill>
-              <a:latin typeface="Verdana" panose="020B0604030504040204" pitchFamily="34" charset="0"/>
-              <a:ea typeface="Verdana" panose="020B0604030504040204" pitchFamily="34" charset="0"/>
-              <a:cs typeface="Verdana" panose="020B0604030504040204" pitchFamily="34" charset="0"/>
-            </a:endParaRPr>
-          </a:p>
-        </p:txBody>
-      </p:sp>
-      <p:pic>
-        <p:nvPicPr>
-          <p:cNvPr id="9" name="Immagine 8">
-            <a:extLst>
-              <a:ext uri="{FF2B5EF4-FFF2-40B4-BE49-F238E27FC236}">
-                <a16:creationId xmlns:a16="http://schemas.microsoft.com/office/drawing/2014/main" id="{5B9BB04F-72A0-42BC-9B75-70315414E2C6}"/>
-              </a:ext>
-            </a:extLst>
-          </p:cNvPr>
-          <p:cNvPicPr>
-            <a:picLocks noChangeAspect="1"/>
-          </p:cNvPicPr>
-          <p:nvPr/>
-        </p:nvPicPr>
-        <p:blipFill>
-          <a:blip r:embed="rId3"/>
-          <a:stretch>
-            <a:fillRect/>
-          </a:stretch>
-        </p:blipFill>
-        <p:spPr>
-          <a:xfrm>
-            <a:off x="138896" y="5962648"/>
-            <a:ext cx="2314937" cy="759299"/>
-          </a:xfrm>
-          <a:prstGeom prst="rect">
-            <a:avLst/>
-          </a:prstGeom>
-        </p:spPr>
-      </p:pic>
-      <p:sp>
-        <p:nvSpPr>
-          <p:cNvPr id="10" name="Rettangolo 9">
-            <a:extLst>
-              <a:ext uri="{FF2B5EF4-FFF2-40B4-BE49-F238E27FC236}">
-                <a16:creationId xmlns:a16="http://schemas.microsoft.com/office/drawing/2014/main" id="{2141EEC8-25E2-4B60-8666-E194AF90904F}"/>
-              </a:ext>
-            </a:extLst>
-          </p:cNvPr>
-          <p:cNvSpPr/>
-          <p:nvPr/>
-        </p:nvSpPr>
-        <p:spPr>
-          <a:xfrm>
-            <a:off x="6539021" y="133209"/>
-            <a:ext cx="4763386" cy="2054405"/>
-          </a:xfrm>
-          <a:prstGeom prst="rect">
-            <a:avLst/>
-          </a:prstGeom>
-          <a:solidFill>
-            <a:srgbClr val="595959"/>
-          </a:solidFill>
-          <a:ln>
-            <a:solidFill>
-              <a:srgbClr val="DFE1E2"/>
-            </a:solidFill>
-          </a:ln>
-        </p:spPr>
-        <p:style>
-          <a:lnRef idx="2">
-            <a:schemeClr val="accent1">
-              <a:shade val="50000"/>
-            </a:schemeClr>
-          </a:lnRef>
-          <a:fillRef idx="1">
-            <a:schemeClr val="accent1"/>
-          </a:fillRef>
-          <a:effectRef idx="0">
-            <a:schemeClr val="accent1"/>
-          </a:effectRef>
-          <a:fontRef idx="minor">
-            <a:schemeClr val="lt1"/>
-          </a:fontRef>
-        </p:style>
-        <p:txBody>
-          <a:bodyPr rtlCol="0" anchor="ctr"/>
-          <a:lstStyle/>
-          <a:p>
-            <a:pPr algn="ctr"/>
-            <a:endParaRPr lang="it-IT" dirty="0"/>
-          </a:p>
-        </p:txBody>
-      </p:sp>
-      <p:pic>
-        <p:nvPicPr>
-          <p:cNvPr id="16" name="Immagine 15">
-            <a:extLst>
-              <a:ext uri="{FF2B5EF4-FFF2-40B4-BE49-F238E27FC236}">
-                <a16:creationId xmlns:a16="http://schemas.microsoft.com/office/drawing/2014/main" id="{6ED8ED5C-73FC-4A85-AC5B-59D14338860A}"/>
-              </a:ext>
-            </a:extLst>
-          </p:cNvPr>
-          <p:cNvPicPr>
-            <a:picLocks noChangeAspect="1"/>
-          </p:cNvPicPr>
-          <p:nvPr/>
-        </p:nvPicPr>
-        <p:blipFill rotWithShape="1">
-          <a:blip r:embed="rId4"/>
-          <a:srcRect r="55087"/>
-          <a:stretch/>
-        </p:blipFill>
-        <p:spPr>
-          <a:xfrm>
-            <a:off x="6864118" y="226278"/>
-            <a:ext cx="4113185" cy="1868265"/>
-          </a:xfrm>
-          <a:prstGeom prst="rect">
-            <a:avLst/>
-          </a:prstGeom>
-        </p:spPr>
-      </p:pic>
-      <p:pic>
-        <p:nvPicPr>
-          <p:cNvPr id="20" name="Immagine 19">
-            <a:extLst>
-              <a:ext uri="{FF2B5EF4-FFF2-40B4-BE49-F238E27FC236}">
-                <a16:creationId xmlns:a16="http://schemas.microsoft.com/office/drawing/2014/main" id="{DCA54BCE-7980-4B5F-99F4-0E08B8308D86}"/>
-              </a:ext>
-            </a:extLst>
-          </p:cNvPr>
-          <p:cNvPicPr>
-            <a:picLocks noChangeAspect="1"/>
-          </p:cNvPicPr>
-          <p:nvPr/>
-        </p:nvPicPr>
-        <p:blipFill>
-          <a:blip r:embed="rId5"/>
-          <a:stretch>
-            <a:fillRect/>
-          </a:stretch>
-        </p:blipFill>
-        <p:spPr>
-          <a:xfrm>
-            <a:off x="138896" y="4774920"/>
-            <a:ext cx="757752" cy="759299"/>
-          </a:xfrm>
-          <a:prstGeom prst="rect">
-            <a:avLst/>
-          </a:prstGeom>
-        </p:spPr>
-      </p:pic>
-    </p:spTree>
-    <p:extLst>
-      <p:ext uri="{BB962C8B-B14F-4D97-AF65-F5344CB8AC3E}">
-        <p14:creationId xmlns:p14="http://schemas.microsoft.com/office/powerpoint/2010/main" val="830788148"/>
-      </p:ext>
-    </p:extLst>
-  </p:cSld>
-  <p:clrMapOvr>
-    <a:masterClrMapping/>
-  </p:clrMapOvr>
-</p:sld>
-</file>
-
-<file path=ppt/slides/slide13.xml><?xml version="1.0" encoding="utf-8"?>
 <p:sld xmlns:a="http://schemas.openxmlformats.org/drawingml/2006/main" xmlns:r="http://schemas.openxmlformats.org/officeDocument/2006/relationships" xmlns:p="http://schemas.openxmlformats.org/presentationml/2006/main">
   <p:cSld>
     <p:spTree>
@@ -39186,7 +38551,7 @@
                 <a:cs typeface="Verdana" panose="020B0604030504040204" pitchFamily="34" charset="0"/>
               </a:rPr>
               <a:pPr/>
-              <a:t>13</a:t>
+              <a:t>12</a:t>
             </a:fld>
             <a:endParaRPr lang="en-US" sz="2000" dirty="0">
               <a:latin typeface="Verdana" panose="020B0604030504040204" pitchFamily="34" charset="0"/>
@@ -39897,7 +39262,7 @@
                 <a:ea typeface="Verdana" panose="020B0604030504040204" pitchFamily="34" charset="0"/>
                 <a:cs typeface="Verdana" panose="020B0604030504040204" pitchFamily="34" charset="0"/>
               </a:rPr>
-              <a:t>Introdotta nello Standard 4.0 da SIG</a:t>
+              <a:t>Introdotta nello Standard 4.0 da SIG.</a:t>
             </a:r>
           </a:p>
           <a:p>
@@ -39911,7 +39276,7 @@
                 <a:ea typeface="Verdana" panose="020B0604030504040204" pitchFamily="34" charset="0"/>
                 <a:cs typeface="Verdana" panose="020B0604030504040204" pitchFamily="34" charset="0"/>
               </a:rPr>
-              <a:t>Banda di frequenze ISM, molte fonti di interferenza</a:t>
+              <a:t>Banda di frequenze ISM, molte fonti di interferenza.</a:t>
             </a:r>
           </a:p>
           <a:p>
@@ -39983,11 +39348,14 @@
               </a:rPr>
               <a:t>Selection</a:t>
             </a:r>
-            <a:endParaRPr lang="it-IT" sz="2400" dirty="0">
-              <a:latin typeface="Verdana" panose="020B0604030504040204" pitchFamily="34" charset="0"/>
-              <a:ea typeface="Verdana" panose="020B0604030504040204" pitchFamily="34" charset="0"/>
-              <a:cs typeface="Verdana" panose="020B0604030504040204" pitchFamily="34" charset="0"/>
-            </a:endParaRPr>
+            <a:r>
+              <a:rPr lang="it-IT" sz="2400" dirty="0">
+                <a:latin typeface="Verdana" panose="020B0604030504040204" pitchFamily="34" charset="0"/>
+                <a:ea typeface="Verdana" panose="020B0604030504040204" pitchFamily="34" charset="0"/>
+                <a:cs typeface="Verdana" panose="020B0604030504040204" pitchFamily="34" charset="0"/>
+              </a:rPr>
+              <a:t>.</a:t>
+            </a:r>
           </a:p>
           <a:p>
             <a:pPr marL="342900" indent="-342900">
@@ -40888,7 +40256,7 @@
                 <a:ea typeface="Verdana" panose="020B0604030504040204" pitchFamily="34" charset="0"/>
                 <a:cs typeface="Verdana" panose="020B0604030504040204" pitchFamily="34" charset="0"/>
               </a:rPr>
-              <a:t>Seguire una connessione richiede di essere in ascolto in tutti i canali trasmissivi</a:t>
+              <a:t>Seguire una connessione richiede di essere in ascolto in tutti i canali trasmissivi.</a:t>
             </a:r>
           </a:p>
           <a:p>
@@ -40916,7 +40284,7 @@
                 <a:ea typeface="Verdana" panose="020B0604030504040204" pitchFamily="34" charset="0"/>
                 <a:cs typeface="Verdana" panose="020B0604030504040204" pitchFamily="34" charset="0"/>
               </a:rPr>
-              <a:t>Tramite due USRP B210 è possibile catturare tutte le trasmissioni nella Banda BLE</a:t>
+              <a:t>Tramite due USRP B210 è possibile catturare tutte le trasmissioni nella Banda BLE.</a:t>
             </a:r>
           </a:p>
           <a:p>
@@ -41016,7 +40384,7 @@
                 <a:ea typeface="Verdana" panose="020B0604030504040204" pitchFamily="34" charset="0"/>
                 <a:cs typeface="Verdana" panose="020B0604030504040204" pitchFamily="34" charset="0"/>
               </a:rPr>
-              <a:t> BPA Low Energy, con cui si riescono a catturare tutti i pacchetti di una connessione</a:t>
+              <a:t> BPA Low Energy, con cui si riescono a catturare tutti i pacchetti di una connessione.</a:t>
             </a:r>
           </a:p>
           <a:p>
@@ -42604,7 +41972,7 @@
                 <a:ea typeface="Verdana" panose="020B0604030504040204" pitchFamily="34" charset="0"/>
                 <a:cs typeface="Verdana" panose="020B0604030504040204" pitchFamily="34" charset="0"/>
               </a:rPr>
-              <a:t>42 : </a:t>
+              <a:t>40 : </a:t>
             </a:r>
             <a:r>
               <a:rPr lang="it-IT" sz="2000" dirty="0">
@@ -42612,7 +41980,7 @@
                 <a:ea typeface="Verdana" panose="020B0604030504040204" pitchFamily="34" charset="0"/>
                 <a:cs typeface="Verdana" panose="020B0604030504040204" pitchFamily="34" charset="0"/>
               </a:rPr>
-              <a:t>ADV_NONCONN_IND, </a:t>
+              <a:t>ADV_IND, </a:t>
             </a:r>
             <a:r>
               <a:rPr lang="it-IT" sz="2000" dirty="0" err="1">
@@ -42628,7 +41996,7 @@
                 <a:ea typeface="Verdana" panose="020B0604030504040204" pitchFamily="34" charset="0"/>
                 <a:cs typeface="Verdana" panose="020B0604030504040204" pitchFamily="34" charset="0"/>
               </a:rPr>
-              <a:t> di non connessione ad indirizzo privato.</a:t>
+              <a:t> di connessione indiretto, indirizzo privato.</a:t>
             </a:r>
           </a:p>
           <a:p>
@@ -42887,7 +42255,7 @@
           <p:nvPr>
             <p:extLst>
               <p:ext uri="{D42A27DB-BD31-4B8C-83A1-F6EECF244321}">
-                <p14:modId xmlns:p14="http://schemas.microsoft.com/office/powerpoint/2010/main" val="3425600089"/>
+                <p14:modId xmlns:p14="http://schemas.microsoft.com/office/powerpoint/2010/main" val="582703024"/>
               </p:ext>
             </p:extLst>
           </p:nvPr>
@@ -43679,7 +43047,7 @@
                           <a:effectLst/>
                           <a:latin typeface="Calibri" panose="020F0502020204030204" pitchFamily="34" charset="0"/>
                         </a:rPr>
-                        <a:t>42</a:t>
+                        <a:t>40</a:t>
                       </a:r>
                     </a:p>
                   </a:txBody>

</xml_diff>